<commit_message>
add contents of python
</commit_message>
<xml_diff>
--- a/PPT_IMAGE/blog.pptx
+++ b/PPT_IMAGE/blog.pptx
@@ -8,6 +8,7 @@
     <p:sldId id="256" r:id="rId2"/>
     <p:sldId id="259" r:id="rId3"/>
     <p:sldId id="260" r:id="rId4"/>
+    <p:sldId id="261" r:id="rId5"/>
   </p:sldIdLst>
   <p:sldSz cx="12192000" cy="6858000"/>
   <p:notesSz cx="6858000" cy="9144000"/>
@@ -245,7 +246,7 @@
           <a:p>
             <a:fld id="{C9088C61-D230-4CA2-9700-815054BE693D}" type="datetimeFigureOut">
               <a:rPr lang="ko-KR" altLang="en-US" smtClean="0"/>
-              <a:t>2018-07-28</a:t>
+              <a:t>2018-07-30</a:t>
             </a:fld>
             <a:endParaRPr lang="ko-KR" altLang="en-US"/>
           </a:p>
@@ -415,7 +416,7 @@
           <a:p>
             <a:fld id="{C9088C61-D230-4CA2-9700-815054BE693D}" type="datetimeFigureOut">
               <a:rPr lang="ko-KR" altLang="en-US" smtClean="0"/>
-              <a:t>2018-07-28</a:t>
+              <a:t>2018-07-30</a:t>
             </a:fld>
             <a:endParaRPr lang="ko-KR" altLang="en-US"/>
           </a:p>
@@ -595,7 +596,7 @@
           <a:p>
             <a:fld id="{C9088C61-D230-4CA2-9700-815054BE693D}" type="datetimeFigureOut">
               <a:rPr lang="ko-KR" altLang="en-US" smtClean="0"/>
-              <a:t>2018-07-28</a:t>
+              <a:t>2018-07-30</a:t>
             </a:fld>
             <a:endParaRPr lang="ko-KR" altLang="en-US"/>
           </a:p>
@@ -765,7 +766,7 @@
           <a:p>
             <a:fld id="{C9088C61-D230-4CA2-9700-815054BE693D}" type="datetimeFigureOut">
               <a:rPr lang="ko-KR" altLang="en-US" smtClean="0"/>
-              <a:t>2018-07-28</a:t>
+              <a:t>2018-07-30</a:t>
             </a:fld>
             <a:endParaRPr lang="ko-KR" altLang="en-US"/>
           </a:p>
@@ -1011,7 +1012,7 @@
           <a:p>
             <a:fld id="{C9088C61-D230-4CA2-9700-815054BE693D}" type="datetimeFigureOut">
               <a:rPr lang="ko-KR" altLang="en-US" smtClean="0"/>
-              <a:t>2018-07-28</a:t>
+              <a:t>2018-07-30</a:t>
             </a:fld>
             <a:endParaRPr lang="ko-KR" altLang="en-US"/>
           </a:p>
@@ -1243,7 +1244,7 @@
           <a:p>
             <a:fld id="{C9088C61-D230-4CA2-9700-815054BE693D}" type="datetimeFigureOut">
               <a:rPr lang="ko-KR" altLang="en-US" smtClean="0"/>
-              <a:t>2018-07-28</a:t>
+              <a:t>2018-07-30</a:t>
             </a:fld>
             <a:endParaRPr lang="ko-KR" altLang="en-US"/>
           </a:p>
@@ -1610,7 +1611,7 @@
           <a:p>
             <a:fld id="{C9088C61-D230-4CA2-9700-815054BE693D}" type="datetimeFigureOut">
               <a:rPr lang="ko-KR" altLang="en-US" smtClean="0"/>
-              <a:t>2018-07-28</a:t>
+              <a:t>2018-07-30</a:t>
             </a:fld>
             <a:endParaRPr lang="ko-KR" altLang="en-US"/>
           </a:p>
@@ -1728,7 +1729,7 @@
           <a:p>
             <a:fld id="{C9088C61-D230-4CA2-9700-815054BE693D}" type="datetimeFigureOut">
               <a:rPr lang="ko-KR" altLang="en-US" smtClean="0"/>
-              <a:t>2018-07-28</a:t>
+              <a:t>2018-07-30</a:t>
             </a:fld>
             <a:endParaRPr lang="ko-KR" altLang="en-US"/>
           </a:p>
@@ -1823,7 +1824,7 @@
           <a:p>
             <a:fld id="{C9088C61-D230-4CA2-9700-815054BE693D}" type="datetimeFigureOut">
               <a:rPr lang="ko-KR" altLang="en-US" smtClean="0"/>
-              <a:t>2018-07-28</a:t>
+              <a:t>2018-07-30</a:t>
             </a:fld>
             <a:endParaRPr lang="ko-KR" altLang="en-US"/>
           </a:p>
@@ -2100,7 +2101,7 @@
           <a:p>
             <a:fld id="{C9088C61-D230-4CA2-9700-815054BE693D}" type="datetimeFigureOut">
               <a:rPr lang="ko-KR" altLang="en-US" smtClean="0"/>
-              <a:t>2018-07-28</a:t>
+              <a:t>2018-07-30</a:t>
             </a:fld>
             <a:endParaRPr lang="ko-KR" altLang="en-US"/>
           </a:p>
@@ -2353,7 +2354,7 @@
           <a:p>
             <a:fld id="{C9088C61-D230-4CA2-9700-815054BE693D}" type="datetimeFigureOut">
               <a:rPr lang="ko-KR" altLang="en-US" smtClean="0"/>
-              <a:t>2018-07-28</a:t>
+              <a:t>2018-07-30</a:t>
             </a:fld>
             <a:endParaRPr lang="ko-KR" altLang="en-US"/>
           </a:p>
@@ -2566,7 +2567,7 @@
           <a:p>
             <a:fld id="{C9088C61-D230-4CA2-9700-815054BE693D}" type="datetimeFigureOut">
               <a:rPr lang="ko-KR" altLang="en-US" smtClean="0"/>
-              <a:t>2018-07-28</a:t>
+              <a:t>2018-07-30</a:t>
             </a:fld>
             <a:endParaRPr lang="ko-KR" altLang="en-US"/>
           </a:p>
@@ -3325,6 +3326,121 @@
 </p:sld>
 </file>
 
+<file path=ppt/slides/slide4.xml><?xml version="1.0" encoding="utf-8"?>
+<p:sld xmlns:a="http://schemas.openxmlformats.org/drawingml/2006/main" xmlns:r="http://schemas.openxmlformats.org/officeDocument/2006/relationships" xmlns:p="http://schemas.openxmlformats.org/presentationml/2006/main">
+  <p:cSld>
+    <p:bg>
+      <p:bgPr>
+        <a:solidFill>
+          <a:schemeClr val="tx1">
+            <a:lumMod val="75000"/>
+            <a:lumOff val="25000"/>
+          </a:schemeClr>
+        </a:solidFill>
+        <a:effectLst/>
+      </p:bgPr>
+    </p:bg>
+    <p:spTree>
+      <p:nvGrpSpPr>
+        <p:cNvPr id="1" name=""/>
+        <p:cNvGrpSpPr/>
+        <p:nvPr/>
+      </p:nvGrpSpPr>
+      <p:grpSpPr>
+        <a:xfrm>
+          <a:off x="0" y="0"/>
+          <a:ext cx="0" cy="0"/>
+          <a:chOff x="0" y="0"/>
+          <a:chExt cx="0" cy="0"/>
+        </a:xfrm>
+      </p:grpSpPr>
+      <p:sp>
+        <p:nvSpPr>
+          <p:cNvPr id="2" name="제목 1"/>
+          <p:cNvSpPr>
+            <a:spLocks noGrp="1"/>
+          </p:cNvSpPr>
+          <p:nvPr>
+            <p:ph type="ctrTitle"/>
+          </p:nvPr>
+        </p:nvSpPr>
+        <p:spPr>
+          <a:xfrm>
+            <a:off x="1524000" y="1122362"/>
+            <a:ext cx="9144000" cy="3626919"/>
+          </a:xfrm>
+        </p:spPr>
+        <p:txBody>
+          <a:bodyPr>
+            <a:normAutofit/>
+          </a:bodyPr>
+          <a:lstStyle/>
+          <a:p>
+            <a:r>
+              <a:rPr lang="en-US" altLang="ko-KR" sz="7200" dirty="0" smtClean="0">
+                <a:solidFill>
+                  <a:schemeClr val="bg1"/>
+                </a:solidFill>
+                <a:latin typeface="Comic Sans MS" panose="030F0702030302020204" pitchFamily="66" charset="0"/>
+              </a:rPr>
+              <a:t>Data Type</a:t>
+            </a:r>
+            <a:br>
+              <a:rPr lang="en-US" altLang="ko-KR" sz="7200" dirty="0" smtClean="0">
+                <a:solidFill>
+                  <a:schemeClr val="bg1"/>
+                </a:solidFill>
+                <a:latin typeface="Comic Sans MS" panose="030F0702030302020204" pitchFamily="66" charset="0"/>
+              </a:rPr>
+            </a:br>
+            <a:r>
+              <a:rPr lang="en-US" altLang="ko-KR" sz="7200" dirty="0">
+                <a:solidFill>
+                  <a:schemeClr val="bg1"/>
+                </a:solidFill>
+                <a:latin typeface="Comic Sans MS" panose="030F0702030302020204" pitchFamily="66" charset="0"/>
+              </a:rPr>
+              <a:t/>
+            </a:r>
+            <a:br>
+              <a:rPr lang="en-US" altLang="ko-KR" sz="7200" dirty="0">
+                <a:solidFill>
+                  <a:schemeClr val="bg1"/>
+                </a:solidFill>
+                <a:latin typeface="Comic Sans MS" panose="030F0702030302020204" pitchFamily="66" charset="0"/>
+              </a:rPr>
+            </a:br>
+            <a:r>
+              <a:rPr lang="en-US" altLang="ko-KR" sz="7200" dirty="0" smtClean="0">
+                <a:solidFill>
+                  <a:schemeClr val="bg1"/>
+                </a:solidFill>
+                <a:latin typeface="Comic Sans MS" panose="030F0702030302020204" pitchFamily="66" charset="0"/>
+              </a:rPr>
+              <a:t>String</a:t>
+            </a:r>
+            <a:endParaRPr lang="ko-KR" altLang="en-US" sz="7200" dirty="0">
+              <a:solidFill>
+                <a:schemeClr val="bg1"/>
+              </a:solidFill>
+              <a:latin typeface="Comic Sans MS" panose="030F0702030302020204" pitchFamily="66" charset="0"/>
+            </a:endParaRPr>
+          </a:p>
+        </p:txBody>
+      </p:sp>
+    </p:spTree>
+    <p:extLst>
+      <p:ext uri="{BB962C8B-B14F-4D97-AF65-F5344CB8AC3E}">
+        <p14:creationId xmlns:p14="http://schemas.microsoft.com/office/powerpoint/2010/main" val="2483180329"/>
+      </p:ext>
+    </p:extLst>
+  </p:cSld>
+  <p:clrMapOvr>
+    <a:masterClrMapping/>
+  </p:clrMapOvr>
+</p:sld>
+</file>
+
 <file path=ppt/theme/theme1.xml><?xml version="1.0" encoding="utf-8"?>
 <a:theme xmlns:a="http://schemas.openxmlformats.org/drawingml/2006/main" name="Office 테마">
   <a:themeElements>

</xml_diff>

<commit_message>
My python document is modified
</commit_message>
<xml_diff>
--- a/PPT_IMAGE/blog.pptx
+++ b/PPT_IMAGE/blog.pptx
@@ -9,6 +9,8 @@
     <p:sldId id="259" r:id="rId3"/>
     <p:sldId id="260" r:id="rId4"/>
     <p:sldId id="261" r:id="rId5"/>
+    <p:sldId id="262" r:id="rId6"/>
+    <p:sldId id="263" r:id="rId7"/>
   </p:sldIdLst>
   <p:sldSz cx="12192000" cy="6858000"/>
   <p:notesSz cx="6858000" cy="9144000"/>
@@ -246,7 +248,7 @@
           <a:p>
             <a:fld id="{C9088C61-D230-4CA2-9700-815054BE693D}" type="datetimeFigureOut">
               <a:rPr lang="ko-KR" altLang="en-US" smtClean="0"/>
-              <a:t>2018-07-30</a:t>
+              <a:t>2018-08-18</a:t>
             </a:fld>
             <a:endParaRPr lang="ko-KR" altLang="en-US"/>
           </a:p>
@@ -416,7 +418,7 @@
           <a:p>
             <a:fld id="{C9088C61-D230-4CA2-9700-815054BE693D}" type="datetimeFigureOut">
               <a:rPr lang="ko-KR" altLang="en-US" smtClean="0"/>
-              <a:t>2018-07-30</a:t>
+              <a:t>2018-08-18</a:t>
             </a:fld>
             <a:endParaRPr lang="ko-KR" altLang="en-US"/>
           </a:p>
@@ -596,7 +598,7 @@
           <a:p>
             <a:fld id="{C9088C61-D230-4CA2-9700-815054BE693D}" type="datetimeFigureOut">
               <a:rPr lang="ko-KR" altLang="en-US" smtClean="0"/>
-              <a:t>2018-07-30</a:t>
+              <a:t>2018-08-18</a:t>
             </a:fld>
             <a:endParaRPr lang="ko-KR" altLang="en-US"/>
           </a:p>
@@ -766,7 +768,7 @@
           <a:p>
             <a:fld id="{C9088C61-D230-4CA2-9700-815054BE693D}" type="datetimeFigureOut">
               <a:rPr lang="ko-KR" altLang="en-US" smtClean="0"/>
-              <a:t>2018-07-30</a:t>
+              <a:t>2018-08-18</a:t>
             </a:fld>
             <a:endParaRPr lang="ko-KR" altLang="en-US"/>
           </a:p>
@@ -1012,7 +1014,7 @@
           <a:p>
             <a:fld id="{C9088C61-D230-4CA2-9700-815054BE693D}" type="datetimeFigureOut">
               <a:rPr lang="ko-KR" altLang="en-US" smtClean="0"/>
-              <a:t>2018-07-30</a:t>
+              <a:t>2018-08-18</a:t>
             </a:fld>
             <a:endParaRPr lang="ko-KR" altLang="en-US"/>
           </a:p>
@@ -1244,7 +1246,7 @@
           <a:p>
             <a:fld id="{C9088C61-D230-4CA2-9700-815054BE693D}" type="datetimeFigureOut">
               <a:rPr lang="ko-KR" altLang="en-US" smtClean="0"/>
-              <a:t>2018-07-30</a:t>
+              <a:t>2018-08-18</a:t>
             </a:fld>
             <a:endParaRPr lang="ko-KR" altLang="en-US"/>
           </a:p>
@@ -1611,7 +1613,7 @@
           <a:p>
             <a:fld id="{C9088C61-D230-4CA2-9700-815054BE693D}" type="datetimeFigureOut">
               <a:rPr lang="ko-KR" altLang="en-US" smtClean="0"/>
-              <a:t>2018-07-30</a:t>
+              <a:t>2018-08-18</a:t>
             </a:fld>
             <a:endParaRPr lang="ko-KR" altLang="en-US"/>
           </a:p>
@@ -1729,7 +1731,7 @@
           <a:p>
             <a:fld id="{C9088C61-D230-4CA2-9700-815054BE693D}" type="datetimeFigureOut">
               <a:rPr lang="ko-KR" altLang="en-US" smtClean="0"/>
-              <a:t>2018-07-30</a:t>
+              <a:t>2018-08-18</a:t>
             </a:fld>
             <a:endParaRPr lang="ko-KR" altLang="en-US"/>
           </a:p>
@@ -1824,7 +1826,7 @@
           <a:p>
             <a:fld id="{C9088C61-D230-4CA2-9700-815054BE693D}" type="datetimeFigureOut">
               <a:rPr lang="ko-KR" altLang="en-US" smtClean="0"/>
-              <a:t>2018-07-30</a:t>
+              <a:t>2018-08-18</a:t>
             </a:fld>
             <a:endParaRPr lang="ko-KR" altLang="en-US"/>
           </a:p>
@@ -2101,7 +2103,7 @@
           <a:p>
             <a:fld id="{C9088C61-D230-4CA2-9700-815054BE693D}" type="datetimeFigureOut">
               <a:rPr lang="ko-KR" altLang="en-US" smtClean="0"/>
-              <a:t>2018-07-30</a:t>
+              <a:t>2018-08-18</a:t>
             </a:fld>
             <a:endParaRPr lang="ko-KR" altLang="en-US"/>
           </a:p>
@@ -2354,7 +2356,7 @@
           <a:p>
             <a:fld id="{C9088C61-D230-4CA2-9700-815054BE693D}" type="datetimeFigureOut">
               <a:rPr lang="ko-KR" altLang="en-US" smtClean="0"/>
-              <a:t>2018-07-30</a:t>
+              <a:t>2018-08-18</a:t>
             </a:fld>
             <a:endParaRPr lang="ko-KR" altLang="en-US"/>
           </a:p>
@@ -2567,7 +2569,7 @@
           <a:p>
             <a:fld id="{C9088C61-D230-4CA2-9700-815054BE693D}" type="datetimeFigureOut">
               <a:rPr lang="ko-KR" altLang="en-US" smtClean="0"/>
-              <a:t>2018-07-30</a:t>
+              <a:t>2018-08-18</a:t>
             </a:fld>
             <a:endParaRPr lang="ko-KR" altLang="en-US"/>
           </a:p>
@@ -3441,6 +3443,228 @@
 </p:sld>
 </file>
 
+<file path=ppt/slides/slide5.xml><?xml version="1.0" encoding="utf-8"?>
+<p:sld xmlns:a="http://schemas.openxmlformats.org/drawingml/2006/main" xmlns:r="http://schemas.openxmlformats.org/officeDocument/2006/relationships" xmlns:p="http://schemas.openxmlformats.org/presentationml/2006/main">
+  <p:cSld>
+    <p:bg>
+      <p:bgPr>
+        <a:solidFill>
+          <a:schemeClr val="tx1">
+            <a:lumMod val="75000"/>
+            <a:lumOff val="25000"/>
+          </a:schemeClr>
+        </a:solidFill>
+        <a:effectLst/>
+      </p:bgPr>
+    </p:bg>
+    <p:spTree>
+      <p:nvGrpSpPr>
+        <p:cNvPr id="1" name=""/>
+        <p:cNvGrpSpPr/>
+        <p:nvPr/>
+      </p:nvGrpSpPr>
+      <p:grpSpPr>
+        <a:xfrm>
+          <a:off x="0" y="0"/>
+          <a:ext cx="0" cy="0"/>
+          <a:chOff x="0" y="0"/>
+          <a:chExt cx="0" cy="0"/>
+        </a:xfrm>
+      </p:grpSpPr>
+      <p:sp>
+        <p:nvSpPr>
+          <p:cNvPr id="2" name="제목 1"/>
+          <p:cNvSpPr>
+            <a:spLocks noGrp="1"/>
+          </p:cNvSpPr>
+          <p:nvPr>
+            <p:ph type="ctrTitle"/>
+          </p:nvPr>
+        </p:nvSpPr>
+        <p:spPr>
+          <a:xfrm>
+            <a:off x="1524000" y="1122362"/>
+            <a:ext cx="9144000" cy="3626919"/>
+          </a:xfrm>
+        </p:spPr>
+        <p:txBody>
+          <a:bodyPr>
+            <a:normAutofit/>
+          </a:bodyPr>
+          <a:lstStyle/>
+          <a:p>
+            <a:r>
+              <a:rPr lang="en-US" altLang="ko-KR" sz="7200" dirty="0" smtClean="0">
+                <a:solidFill>
+                  <a:schemeClr val="bg1"/>
+                </a:solidFill>
+                <a:latin typeface="Comic Sans MS" panose="030F0702030302020204" pitchFamily="66" charset="0"/>
+              </a:rPr>
+              <a:t>Data Type</a:t>
+            </a:r>
+            <a:br>
+              <a:rPr lang="en-US" altLang="ko-KR" sz="7200" dirty="0" smtClean="0">
+                <a:solidFill>
+                  <a:schemeClr val="bg1"/>
+                </a:solidFill>
+                <a:latin typeface="Comic Sans MS" panose="030F0702030302020204" pitchFamily="66" charset="0"/>
+              </a:rPr>
+            </a:br>
+            <a:r>
+              <a:rPr lang="en-US" altLang="ko-KR" sz="7200" dirty="0">
+                <a:solidFill>
+                  <a:schemeClr val="bg1"/>
+                </a:solidFill>
+                <a:latin typeface="Comic Sans MS" panose="030F0702030302020204" pitchFamily="66" charset="0"/>
+              </a:rPr>
+              <a:t/>
+            </a:r>
+            <a:br>
+              <a:rPr lang="en-US" altLang="ko-KR" sz="7200" dirty="0">
+                <a:solidFill>
+                  <a:schemeClr val="bg1"/>
+                </a:solidFill>
+                <a:latin typeface="Comic Sans MS" panose="030F0702030302020204" pitchFamily="66" charset="0"/>
+              </a:rPr>
+            </a:br>
+            <a:r>
+              <a:rPr lang="en-US" altLang="ko-KR" sz="7200" dirty="0">
+                <a:solidFill>
+                  <a:schemeClr val="bg1"/>
+                </a:solidFill>
+                <a:latin typeface="Comic Sans MS" panose="030F0702030302020204" pitchFamily="66" charset="0"/>
+              </a:rPr>
+              <a:t>tuple</a:t>
+            </a:r>
+            <a:r>
+              <a:rPr lang="en-US" altLang="ko-KR" sz="7200">
+                <a:solidFill>
+                  <a:schemeClr val="bg1"/>
+                </a:solidFill>
+                <a:latin typeface="Comic Sans MS" panose="030F0702030302020204" pitchFamily="66" charset="0"/>
+              </a:rPr>
+              <a:t>, </a:t>
+            </a:r>
+            <a:r>
+              <a:rPr lang="en-US" altLang="ko-KR" sz="7200" smtClean="0">
+                <a:solidFill>
+                  <a:schemeClr val="bg1"/>
+                </a:solidFill>
+                <a:latin typeface="Comic Sans MS" panose="030F0702030302020204" pitchFamily="66" charset="0"/>
+              </a:rPr>
+              <a:t>dictionary</a:t>
+            </a:r>
+            <a:endParaRPr lang="ko-KR" altLang="en-US" sz="7200" dirty="0">
+              <a:solidFill>
+                <a:schemeClr val="bg1"/>
+              </a:solidFill>
+              <a:latin typeface="Comic Sans MS" panose="030F0702030302020204" pitchFamily="66" charset="0"/>
+            </a:endParaRPr>
+          </a:p>
+        </p:txBody>
+      </p:sp>
+    </p:spTree>
+    <p:extLst>
+      <p:ext uri="{BB962C8B-B14F-4D97-AF65-F5344CB8AC3E}">
+        <p14:creationId xmlns:p14="http://schemas.microsoft.com/office/powerpoint/2010/main" val="3578164611"/>
+      </p:ext>
+    </p:extLst>
+  </p:cSld>
+  <p:clrMapOvr>
+    <a:masterClrMapping/>
+  </p:clrMapOvr>
+</p:sld>
+</file>
+
+<file path=ppt/slides/slide6.xml><?xml version="1.0" encoding="utf-8"?>
+<p:sld xmlns:a="http://schemas.openxmlformats.org/drawingml/2006/main" xmlns:r="http://schemas.openxmlformats.org/officeDocument/2006/relationships" xmlns:p="http://schemas.openxmlformats.org/presentationml/2006/main">
+  <p:cSld>
+    <p:bg>
+      <p:bgPr>
+        <a:solidFill>
+          <a:schemeClr val="tx1">
+            <a:lumMod val="75000"/>
+            <a:lumOff val="25000"/>
+          </a:schemeClr>
+        </a:solidFill>
+        <a:effectLst/>
+      </p:bgPr>
+    </p:bg>
+    <p:spTree>
+      <p:nvGrpSpPr>
+        <p:cNvPr id="1" name=""/>
+        <p:cNvGrpSpPr/>
+        <p:nvPr/>
+      </p:nvGrpSpPr>
+      <p:grpSpPr>
+        <a:xfrm>
+          <a:off x="0" y="0"/>
+          <a:ext cx="0" cy="0"/>
+          <a:chOff x="0" y="0"/>
+          <a:chExt cx="0" cy="0"/>
+        </a:xfrm>
+      </p:grpSpPr>
+      <p:sp>
+        <p:nvSpPr>
+          <p:cNvPr id="2" name="제목 1"/>
+          <p:cNvSpPr>
+            <a:spLocks noGrp="1"/>
+          </p:cNvSpPr>
+          <p:nvPr>
+            <p:ph type="ctrTitle"/>
+          </p:nvPr>
+        </p:nvSpPr>
+        <p:spPr>
+          <a:xfrm>
+            <a:off x="1524000" y="1122362"/>
+            <a:ext cx="9144000" cy="3626919"/>
+          </a:xfrm>
+        </p:spPr>
+        <p:txBody>
+          <a:bodyPr>
+            <a:normAutofit/>
+          </a:bodyPr>
+          <a:lstStyle/>
+          <a:p>
+            <a:r>
+              <a:rPr lang="en-US" altLang="ko-KR" sz="7200" dirty="0" smtClean="0">
+                <a:solidFill>
+                  <a:schemeClr val="bg1"/>
+                </a:solidFill>
+                <a:latin typeface="Comic Sans MS" panose="030F0702030302020204" pitchFamily="66" charset="0"/>
+              </a:rPr>
+              <a:t>Operators</a:t>
+            </a:r>
+            <a:br>
+              <a:rPr lang="en-US" altLang="ko-KR" sz="7200" dirty="0" smtClean="0">
+                <a:solidFill>
+                  <a:schemeClr val="bg1"/>
+                </a:solidFill>
+                <a:latin typeface="Comic Sans MS" panose="030F0702030302020204" pitchFamily="66" charset="0"/>
+              </a:rPr>
+            </a:br>
+            <a:endParaRPr lang="ko-KR" altLang="en-US" sz="7200" dirty="0">
+              <a:solidFill>
+                <a:schemeClr val="bg1"/>
+              </a:solidFill>
+              <a:latin typeface="Comic Sans MS" panose="030F0702030302020204" pitchFamily="66" charset="0"/>
+            </a:endParaRPr>
+          </a:p>
+        </p:txBody>
+      </p:sp>
+    </p:spTree>
+    <p:extLst>
+      <p:ext uri="{BB962C8B-B14F-4D97-AF65-F5344CB8AC3E}">
+        <p14:creationId xmlns:p14="http://schemas.microsoft.com/office/powerpoint/2010/main" val="2627340400"/>
+      </p:ext>
+    </p:extLst>
+  </p:cSld>
+  <p:clrMapOvr>
+    <a:masterClrMapping/>
+  </p:clrMapOvr>
+</p:sld>
+</file>
+
 <file path=ppt/theme/theme1.xml><?xml version="1.0" encoding="utf-8"?>
 <a:theme xmlns:a="http://schemas.openxmlformats.org/drawingml/2006/main" name="Office 테마">
   <a:themeElements>

</xml_diff>